<commit_message>
Imagenes Slides introducción Test Automation
</commit_message>
<xml_diff>
--- a/Diapositivas/1. Unit Testing.pptx
+++ b/Diapositivas/1. Unit Testing.pptx
@@ -246,7 +246,7 @@
           <a:p>
             <a:fld id="{63D5FC4C-9EE1-4746-A368-724F618FC790}" type="datetimeFigureOut">
               <a:rPr lang="es-PE" smtClean="0"/>
-              <a:t>04/02/2013</a:t>
+              <a:t>12/04/2013</a:t>
             </a:fld>
             <a:endParaRPr lang="es-PE"/>
           </a:p>
@@ -6903,25 +6903,28 @@
           <a:bodyPr/>
           <a:lstStyle/>
           <a:p>
+            <a:pPr marL="0" indent="0" algn="l">
+              <a:buNone/>
+            </a:pPr>
             <a:r>
               <a:rPr lang="es-PE" dirty="0" smtClean="0"/>
               <a:t>Para nuestra suerte no tenemos que implementar nuestra propia</a:t>
             </a:r>
             <a:r>
               <a:rPr lang="es-PE" baseline="0" dirty="0" smtClean="0"/>
-              <a:t> infraestructura para crear test unitarios (</a:t>
-            </a:r>
-            <a:r>
-              <a:rPr lang="en-US" sz="1200" b="0" i="0" kern="1200" dirty="0" smtClean="0">
-                <a:solidFill>
-                  <a:schemeClr val="tx1"/>
-                </a:solidFill>
-                <a:effectLst/>
-                <a:latin typeface="+mn-lt"/>
-                <a:ea typeface="+mn-ea"/>
-                <a:cs typeface="+mn-cs"/>
-              </a:rPr>
-              <a:t>These mechanisms include the ability to find individual tests, assemble them into a test suite to run, execute each test in turn, verify expected outcomes have occurred, collect and report any test failures or test errors and to clean up when they do occur.)</a:t>
+              <a:t> infraestructura para crear test unitarios </a:t>
+            </a:r>
+            <a:r>
+              <a:rPr lang="es-PE" sz="1200" dirty="0" smtClean="0"/>
+              <a:t>(Crear y organizar pruebas,  Ejecutar pruebas, Verificar resultados esperados, Reportar resultados, Detalles</a:t>
+            </a:r>
+            <a:r>
+              <a:rPr lang="es-PE" sz="1200" baseline="0" dirty="0" smtClean="0"/>
+              <a:t> preciosos de las pruebas fallidas</a:t>
+            </a:r>
+            <a:r>
+              <a:rPr lang="es-PE" sz="1200" dirty="0" smtClean="0"/>
+              <a:t>)</a:t>
             </a:r>
           </a:p>
           <a:p>
@@ -6985,6 +6988,30 @@
               <a:t> Frameworks ya q </a:t>
             </a:r>
             <a:r>
+              <a:rPr lang="es-PE" sz="1200" b="0" i="0" kern="1200" baseline="0" noProof="0" dirty="0" smtClean="0">
+                <a:solidFill>
+                  <a:schemeClr val="tx1"/>
+                </a:solidFill>
+                <a:effectLst/>
+                <a:latin typeface="+mn-lt"/>
+                <a:ea typeface="+mn-ea"/>
+                <a:cs typeface="+mn-cs"/>
+              </a:rPr>
+              <a:t>descienden </a:t>
+            </a:r>
+            <a:r>
+              <a:rPr lang="es-PE" sz="1200" b="0" i="0" kern="1200" baseline="0" noProof="0" dirty="0" smtClean="0">
+                <a:solidFill>
+                  <a:schemeClr val="tx1"/>
+                </a:solidFill>
+                <a:effectLst/>
+                <a:latin typeface="+mn-lt"/>
+                <a:ea typeface="+mn-ea"/>
+                <a:cs typeface="+mn-cs"/>
+              </a:rPr>
+              <a:t>o son </a:t>
+            </a:r>
+            <a:r>
               <a:rPr lang="es-PE" sz="1200" b="0" i="0" kern="1200" baseline="0" noProof="0" dirty="0" err="1" smtClean="0">
                 <a:solidFill>
                   <a:schemeClr val="tx1"/>
@@ -6994,7 +7021,7 @@
                 <a:ea typeface="+mn-ea"/>
                 <a:cs typeface="+mn-cs"/>
               </a:rPr>
-              <a:t>decienden</a:t>
+              <a:t>ports</a:t>
             </a:r>
             <a:r>
               <a:rPr lang="es-PE" sz="1200" b="0" i="0" kern="1200" baseline="0" noProof="0" dirty="0" smtClean="0">
@@ -7006,7 +7033,7 @@
                 <a:ea typeface="+mn-ea"/>
                 <a:cs typeface="+mn-cs"/>
               </a:rPr>
-              <a:t> o son </a:t>
+              <a:t> de las primera herramientas de este tipo como es </a:t>
             </a:r>
             <a:r>
               <a:rPr lang="es-PE" sz="1200" b="0" i="0" kern="1200" baseline="0" noProof="0" dirty="0" err="1" smtClean="0">
@@ -7018,31 +7045,7 @@
                 <a:ea typeface="+mn-ea"/>
                 <a:cs typeface="+mn-cs"/>
               </a:rPr>
-              <a:t>ports</a:t>
-            </a:r>
-            <a:r>
-              <a:rPr lang="es-PE" sz="1200" b="0" i="0" kern="1200" baseline="0" noProof="0" dirty="0" smtClean="0">
-                <a:solidFill>
-                  <a:schemeClr val="tx1"/>
-                </a:solidFill>
-                <a:effectLst/>
-                <a:latin typeface="+mn-lt"/>
-                <a:ea typeface="+mn-ea"/>
-                <a:cs typeface="+mn-cs"/>
-              </a:rPr>
-              <a:t> de las primera herramientas de este tipo como es </a:t>
-            </a:r>
-            <a:r>
-              <a:rPr lang="es-PE" sz="1200" b="0" i="0" kern="1200" baseline="0" noProof="0" dirty="0" err="1" smtClean="0">
-                <a:solidFill>
-                  <a:schemeClr val="tx1"/>
-                </a:solidFill>
-                <a:effectLst/>
-                <a:latin typeface="+mn-lt"/>
-                <a:ea typeface="+mn-ea"/>
-                <a:cs typeface="+mn-cs"/>
-              </a:rPr>
-              <a:t>Sunit</a:t>
+              <a:t>SUnit</a:t>
             </a:r>
             <a:r>
               <a:rPr lang="es-PE" sz="1200" b="0" i="0" kern="1200" baseline="0" noProof="0" dirty="0" smtClean="0">
@@ -7079,7 +7082,68 @@
                 <a:ea typeface="+mn-ea"/>
                 <a:cs typeface="+mn-cs"/>
               </a:rPr>
-              <a:t>Es importante decir, que debido a que estas frameworks nos proveen toda la infraestructura para realizar pruebas, no se utilizan únicamente para realizar pruebas unitarias sino también otros tipos de pruebas</a:t>
+              <a:t>Es importante decir, que debido a que estas frameworks nos proveen toda la infraestructura para realizar pruebas, no se utilizan únicamente para realizar pruebas unitarias sino también otros tipos de </a:t>
+            </a:r>
+            <a:r>
+              <a:rPr lang="es-PE" sz="1200" b="0" i="0" kern="1200" baseline="0" noProof="0" dirty="0" smtClean="0">
+                <a:solidFill>
+                  <a:schemeClr val="tx1"/>
+                </a:solidFill>
+                <a:effectLst/>
+                <a:latin typeface="+mn-lt"/>
+                <a:ea typeface="+mn-ea"/>
+                <a:cs typeface="+mn-cs"/>
+              </a:rPr>
+              <a:t>pruebas.</a:t>
+            </a:r>
+          </a:p>
+          <a:p>
+            <a:endParaRPr lang="es-PE" sz="1200" b="0" i="0" kern="1200" baseline="0" noProof="0" dirty="0" smtClean="0">
+              <a:solidFill>
+                <a:schemeClr val="tx1"/>
+              </a:solidFill>
+              <a:effectLst/>
+              <a:latin typeface="+mn-lt"/>
+              <a:ea typeface="+mn-ea"/>
+              <a:cs typeface="+mn-cs"/>
+            </a:endParaRPr>
+          </a:p>
+          <a:p>
+            <a:r>
+              <a:rPr lang="es-PE" sz="1200" b="0" i="0" kern="1200" baseline="0" noProof="0" dirty="0" smtClean="0">
+                <a:solidFill>
+                  <a:schemeClr val="tx1"/>
+                </a:solidFill>
+                <a:effectLst/>
+                <a:latin typeface="+mn-lt"/>
+                <a:ea typeface="+mn-ea"/>
+                <a:cs typeface="+mn-cs"/>
+              </a:rPr>
+              <a:t>Tienen una arquitectura </a:t>
+            </a:r>
+            <a:r>
+              <a:rPr lang="es-PE" sz="1200" b="0" i="0" kern="1200" baseline="0" noProof="0" dirty="0" err="1" smtClean="0">
+                <a:solidFill>
+                  <a:schemeClr val="tx1"/>
+                </a:solidFill>
+                <a:effectLst/>
+                <a:latin typeface="+mn-lt"/>
+                <a:ea typeface="+mn-ea"/>
+                <a:cs typeface="+mn-cs"/>
+              </a:rPr>
+              <a:t>Standart</a:t>
+            </a:r>
+            <a:r>
+              <a:rPr lang="es-PE" sz="1200" b="0" i="0" kern="1200" baseline="0" noProof="0" dirty="0" smtClean="0">
+                <a:solidFill>
+                  <a:schemeClr val="tx1"/>
+                </a:solidFill>
+                <a:effectLst/>
+                <a:latin typeface="+mn-lt"/>
+                <a:ea typeface="+mn-ea"/>
+                <a:cs typeface="+mn-cs"/>
+              </a:rPr>
+              <a:t>, lo que significa que el conocer alguna de estas te permite conocer rápidamente una nueva inclusive en otro lenguaje.</a:t>
             </a:r>
             <a:endParaRPr lang="es-PE" noProof="0" dirty="0"/>
           </a:p>
@@ -7407,7 +7471,7 @@
             <a:fld id="{807CB568-C05F-482F-9F26-AA302B8892DF}" type="datetimeFigureOut">
               <a:rPr lang="es-ES" smtClean="0"/>
               <a:pPr/>
-              <a:t>04/02/2013</a:t>
+              <a:t>12/04/2013</a:t>
             </a:fld>
             <a:endParaRPr lang="es-ES"/>
           </a:p>
@@ -7586,7 +7650,7 @@
             <a:fld id="{807CB568-C05F-482F-9F26-AA302B8892DF}" type="datetimeFigureOut">
               <a:rPr lang="es-ES" smtClean="0"/>
               <a:pPr/>
-              <a:t>04/02/2013</a:t>
+              <a:t>12/04/2013</a:t>
             </a:fld>
             <a:endParaRPr lang="es-ES"/>
           </a:p>
@@ -7775,7 +7839,7 @@
             <a:fld id="{807CB568-C05F-482F-9F26-AA302B8892DF}" type="datetimeFigureOut">
               <a:rPr lang="es-ES" smtClean="0"/>
               <a:pPr/>
-              <a:t>04/02/2013</a:t>
+              <a:t>12/04/2013</a:t>
             </a:fld>
             <a:endParaRPr lang="es-ES"/>
           </a:p>
@@ -7954,7 +8018,7 @@
             <a:fld id="{807CB568-C05F-482F-9F26-AA302B8892DF}" type="datetimeFigureOut">
               <a:rPr lang="es-ES" smtClean="0"/>
               <a:pPr/>
-              <a:t>04/02/2013</a:t>
+              <a:t>12/04/2013</a:t>
             </a:fld>
             <a:endParaRPr lang="es-ES"/>
           </a:p>
@@ -8209,7 +8273,7 @@
             <a:fld id="{807CB568-C05F-482F-9F26-AA302B8892DF}" type="datetimeFigureOut">
               <a:rPr lang="es-ES" smtClean="0"/>
               <a:pPr/>
-              <a:t>04/02/2013</a:t>
+              <a:t>12/04/2013</a:t>
             </a:fld>
             <a:endParaRPr lang="es-ES"/>
           </a:p>
@@ -8506,7 +8570,7 @@
             <a:fld id="{807CB568-C05F-482F-9F26-AA302B8892DF}" type="datetimeFigureOut">
               <a:rPr lang="es-ES" smtClean="0"/>
               <a:pPr/>
-              <a:t>04/02/2013</a:t>
+              <a:t>12/04/2013</a:t>
             </a:fld>
             <a:endParaRPr lang="es-ES"/>
           </a:p>
@@ -8937,7 +9001,7 @@
             <a:fld id="{807CB568-C05F-482F-9F26-AA302B8892DF}" type="datetimeFigureOut">
               <a:rPr lang="es-ES" smtClean="0"/>
               <a:pPr/>
-              <a:t>04/02/2013</a:t>
+              <a:t>12/04/2013</a:t>
             </a:fld>
             <a:endParaRPr lang="es-ES"/>
           </a:p>
@@ -9064,7 +9128,7 @@
             <a:fld id="{807CB568-C05F-482F-9F26-AA302B8892DF}" type="datetimeFigureOut">
               <a:rPr lang="es-ES" smtClean="0"/>
               <a:pPr/>
-              <a:t>04/02/2013</a:t>
+              <a:t>12/04/2013</a:t>
             </a:fld>
             <a:endParaRPr lang="es-ES"/>
           </a:p>
@@ -9168,7 +9232,7 @@
             <a:fld id="{807CB568-C05F-482F-9F26-AA302B8892DF}" type="datetimeFigureOut">
               <a:rPr lang="es-ES" smtClean="0"/>
               <a:pPr/>
-              <a:t>04/02/2013</a:t>
+              <a:t>12/04/2013</a:t>
             </a:fld>
             <a:endParaRPr lang="es-ES"/>
           </a:p>
@@ -9454,7 +9518,7 @@
             <a:fld id="{807CB568-C05F-482F-9F26-AA302B8892DF}" type="datetimeFigureOut">
               <a:rPr lang="es-ES" smtClean="0"/>
               <a:pPr/>
-              <a:t>04/02/2013</a:t>
+              <a:t>12/04/2013</a:t>
             </a:fld>
             <a:endParaRPr lang="es-ES"/>
           </a:p>
@@ -9723,7 +9787,7 @@
             <a:fld id="{807CB568-C05F-482F-9F26-AA302B8892DF}" type="datetimeFigureOut">
               <a:rPr lang="es-ES" smtClean="0"/>
               <a:pPr/>
-              <a:t>04/02/2013</a:t>
+              <a:t>12/04/2013</a:t>
             </a:fld>
             <a:endParaRPr lang="es-ES"/>
           </a:p>
@@ -9974,7 +10038,7 @@
             <a:fld id="{807CB568-C05F-482F-9F26-AA302B8892DF}" type="datetimeFigureOut">
               <a:rPr lang="es-ES" smtClean="0"/>
               <a:pPr/>
-              <a:t>04/02/2013</a:t>
+              <a:t>12/04/2013</a:t>
             </a:fld>
             <a:endParaRPr lang="es-ES"/>
           </a:p>
@@ -13266,8 +13330,8 @@
         </p:nvSpPr>
         <p:spPr bwMode="auto">
           <a:xfrm>
-            <a:off x="257219" y="1144702"/>
-            <a:ext cx="8712968" cy="864096"/>
+            <a:off x="257218" y="1144702"/>
+            <a:ext cx="8729602" cy="988154"/>
           </a:xfrm>
           <a:prstGeom prst="rect">
             <a:avLst/>
@@ -13440,21 +13504,10 @@
           </a:lstStyle>
           <a:p>
             <a:r>
-              <a:rPr lang="es-PE" sz="2400" dirty="0"/>
-              <a:t>Métodos </a:t>
-            </a:r>
-            <a:r>
               <a:rPr lang="es-PE" sz="2400" dirty="0" smtClean="0"/>
-              <a:t>sencillos que podemos utilizar para </a:t>
-            </a:r>
-            <a:r>
-              <a:rPr lang="es-PE" sz="2400" dirty="0"/>
-              <a:t>verificar el éxito o fracaso de nuestras pruebas</a:t>
-            </a:r>
-            <a:r>
-              <a:rPr lang="es-PE" sz="2400" dirty="0" smtClean="0"/>
-              <a:t>.</a:t>
-            </a:r>
+              <a:t>Utilitarios que sirven para comprobar que los valores obtenidos al ejecutar la prueba cumplen las condiciones esperadas. </a:t>
+            </a:r>
+            <a:endParaRPr lang="es-PE" sz="2400" dirty="0" smtClean="0"/>
           </a:p>
         </p:txBody>
       </p:sp>
@@ -13645,8 +13698,8 @@
         </p:nvSpPr>
         <p:spPr bwMode="auto">
           <a:xfrm>
-            <a:off x="273852" y="4332307"/>
-            <a:ext cx="8712968" cy="864096"/>
+            <a:off x="273852" y="4495576"/>
+            <a:ext cx="8712968" cy="1227316"/>
           </a:xfrm>
           <a:prstGeom prst="rect">
             <a:avLst/>
@@ -13820,7 +13873,15 @@
           <a:p>
             <a:r>
               <a:rPr lang="es-PE" sz="2400" dirty="0" smtClean="0"/>
-              <a:t>Si el test falla, nos devuelven un mensaje con información precisa para poder solucionar el problema.</a:t>
+              <a:t>Si </a:t>
+            </a:r>
+            <a:r>
+              <a:rPr lang="es-PE" sz="2400" dirty="0" smtClean="0"/>
+              <a:t>la condición no se cumple, se lanza una excepción y nos </a:t>
+            </a:r>
+            <a:r>
+              <a:rPr lang="es-PE" sz="2400" dirty="0" smtClean="0"/>
+              <a:t>devuelven un mensaje con información precisa para poder solucionar el problema.</a:t>
             </a:r>
             <a:endParaRPr lang="es-PE" sz="2400" dirty="0" smtClean="0">
               <a:solidFill>
@@ -13838,7 +13899,7 @@
         </p:nvSpPr>
         <p:spPr>
           <a:xfrm>
-            <a:off x="1472292" y="5271591"/>
+            <a:off x="1472292" y="5794900"/>
             <a:ext cx="6454011" cy="461665"/>
           </a:xfrm>
           <a:prstGeom prst="rect">
@@ -13939,7 +14000,7 @@
         </p:blipFill>
         <p:spPr bwMode="auto">
           <a:xfrm>
-            <a:off x="2301473" y="2185611"/>
+            <a:off x="2301473" y="2276872"/>
             <a:ext cx="4657725" cy="1943100"/>
           </a:xfrm>
           <a:prstGeom prst="rect">
@@ -26872,7 +26933,7 @@
         </p:nvSpPr>
         <p:spPr bwMode="auto">
           <a:xfrm>
-            <a:off x="323528" y="1484784"/>
+            <a:off x="323528" y="1345630"/>
             <a:ext cx="8568952" cy="3888432"/>
           </a:xfrm>
           <a:prstGeom prst="rect">
@@ -27045,16 +27106,56 @@
             </a:lvl9pPr>
           </a:lstStyle>
           <a:p>
-            <a:pPr marL="0" indent="0">
+            <a:pPr marL="0" indent="0" algn="ctr">
               <a:buNone/>
             </a:pPr>
             <a:r>
               <a:rPr lang="es-PE" sz="2800" dirty="0" smtClean="0"/>
-              <a:t>Frameworks que nos proveen todos los mecanismos necesarios para ejecutar la lógica específica a nuestra prueba sin preocuparnos por la infraestructura necesaria.</a:t>
-            </a:r>
-          </a:p>
-          <a:p>
-            <a:pPr marL="0" indent="0">
+              <a:t>Permiten ejecutar lógica </a:t>
+            </a:r>
+            <a:r>
+              <a:rPr lang="es-PE" sz="2800" dirty="0" smtClean="0"/>
+              <a:t>específica a </a:t>
+            </a:r>
+            <a:r>
+              <a:rPr lang="es-PE" sz="2800" dirty="0" smtClean="0"/>
+              <a:t>nuestras pruebas </a:t>
+            </a:r>
+            <a:r>
+              <a:rPr lang="es-PE" sz="2800" dirty="0" smtClean="0"/>
+              <a:t>sin preocuparnos por la infraestructura </a:t>
+            </a:r>
+            <a:r>
+              <a:rPr lang="es-PE" sz="2800" dirty="0" smtClean="0"/>
+              <a:t>necesaria.</a:t>
+            </a:r>
+          </a:p>
+          <a:p>
+            <a:pPr marL="0" indent="0" algn="ctr">
+              <a:buNone/>
+            </a:pPr>
+            <a:endParaRPr lang="es-PE" sz="1200" dirty="0" smtClean="0"/>
+          </a:p>
+          <a:p>
+            <a:pPr marL="0" indent="0" algn="ctr">
+              <a:buNone/>
+            </a:pPr>
+            <a:r>
+              <a:rPr lang="es-PE" sz="2400" dirty="0" smtClean="0"/>
+              <a:t>(Crear, Organizar y Ejecutar pruebas,</a:t>
+            </a:r>
+          </a:p>
+          <a:p>
+            <a:pPr marL="0" indent="0" algn="ctr">
+              <a:buNone/>
+            </a:pPr>
+            <a:r>
+              <a:rPr lang="es-PE" sz="2400" dirty="0" smtClean="0"/>
+              <a:t>Comparar esperados vs obtenidos, Reportar resultados)</a:t>
+            </a:r>
+          </a:p>
+          <a:p>
+            <a:pPr marL="0" indent="0" algn="ctr">
               <a:buNone/>
             </a:pPr>
             <a:endParaRPr lang="es-PE" sz="2800" dirty="0" smtClean="0"/>
@@ -27073,15 +27174,15 @@
               <a:t>.NET:  </a:t>
             </a:r>
             <a:r>
-              <a:rPr lang="es-PE" sz="2400" dirty="0" err="1"/>
+              <a:rPr lang="es-PE" sz="2400" dirty="0" err="1" smtClean="0"/>
               <a:t>NUnit</a:t>
             </a:r>
             <a:r>
-              <a:rPr lang="es-PE" sz="2400" dirty="0"/>
+              <a:rPr lang="es-PE" sz="2400" dirty="0" smtClean="0"/>
               <a:t>, </a:t>
             </a:r>
             <a:r>
-              <a:rPr lang="es-PE" dirty="0" err="1">
+              <a:rPr lang="es-PE" dirty="0" err="1" smtClean="0">
                 <a:solidFill>
                   <a:srgbClr val="FFC000"/>
                 </a:solidFill>
@@ -27089,7 +27190,7 @@
               <a:t>MSTest</a:t>
             </a:r>
             <a:r>
-              <a:rPr lang="es-PE" dirty="0">
+              <a:rPr lang="es-PE" dirty="0" smtClean="0">
                 <a:solidFill>
                   <a:srgbClr val="FFC000"/>
                 </a:solidFill>
@@ -27102,15 +27203,11 @@
             </a:r>
             <a:r>
               <a:rPr lang="es-PE" sz="2400" dirty="0" err="1" smtClean="0"/>
-              <a:t>Mbunit</a:t>
-            </a:r>
-            <a:r>
-              <a:rPr lang="es-PE" sz="2400" dirty="0"/>
-              <a:t> </a:t>
+              <a:t>MbUnit</a:t>
             </a:r>
             <a:r>
               <a:rPr lang="es-PE" sz="2400" dirty="0" smtClean="0"/>
-              <a:t>…..</a:t>
+              <a:t> …..</a:t>
             </a:r>
           </a:p>
           <a:p>
@@ -27119,12 +27216,20 @@
               <a:buChar char="o"/>
             </a:pPr>
             <a:r>
+              <a:rPr lang="es-PE" sz="3000" dirty="0" smtClean="0">
+                <a:solidFill>
+                  <a:srgbClr val="FF0000"/>
+                </a:solidFill>
+              </a:rPr>
+              <a:t>Java</a:t>
+            </a:r>
+            <a:r>
               <a:rPr lang="es-PE" sz="3000" dirty="0">
                 <a:solidFill>
                   <a:srgbClr val="FF0000"/>
                 </a:solidFill>
               </a:rPr>
-              <a:t>Java:   </a:t>
+              <a:t>:   </a:t>
             </a:r>
             <a:r>
               <a:rPr lang="es-PE" sz="2400" dirty="0" err="1"/>
@@ -27156,16 +27261,9 @@
             </a:r>
             <a:r>
               <a:rPr lang="es-PE" sz="2400" dirty="0" smtClean="0"/>
-              <a:t>, </a:t>
-            </a:r>
-            <a:r>
-              <a:rPr lang="es-PE" sz="2400" dirty="0" err="1" smtClean="0"/>
-              <a:t>JTiger</a:t>
-            </a:r>
-            <a:r>
-              <a:rPr lang="es-PE" sz="2400" dirty="0" smtClean="0"/>
-              <a:t> ….. </a:t>
-            </a:r>
+              <a:t>, ….. </a:t>
+            </a:r>
+            <a:endParaRPr lang="es-PE" sz="2400" dirty="0" smtClean="0"/>
           </a:p>
           <a:p>
             <a:pPr lvl="1" indent="-342900">
@@ -27221,7 +27319,7 @@
         </p:nvSpPr>
         <p:spPr bwMode="auto">
           <a:xfrm>
-            <a:off x="493204" y="471810"/>
+            <a:off x="493204" y="332656"/>
             <a:ext cx="8229600" cy="724942"/>
           </a:xfrm>
           <a:prstGeom prst="rect">

</xml_diff>

<commit_message>
Documentos divididos por temas
</commit_message>
<xml_diff>
--- a/Diapositivas/1. Unit Testing.pptx
+++ b/Diapositivas/1. Unit Testing.pptx
@@ -246,7 +246,7 @@
           <a:p>
             <a:fld id="{63D5FC4C-9EE1-4746-A368-724F618FC790}" type="datetimeFigureOut">
               <a:rPr lang="es-PE" smtClean="0"/>
-              <a:t>12/04/2013</a:t>
+              <a:t>17/04/2013</a:t>
             </a:fld>
             <a:endParaRPr lang="es-PE"/>
           </a:p>
@@ -889,32 +889,6 @@
               <a:t> con JAVA.</a:t>
             </a:r>
           </a:p>
-          <a:p>
-            <a:endParaRPr lang="en-US" baseline="0" noProof="0" dirty="0" smtClean="0"/>
-          </a:p>
-          <a:p>
-            <a:r>
-              <a:rPr lang="en-US" b="1" u="sng" baseline="0" noProof="0" dirty="0" err="1" smtClean="0"/>
-              <a:t>Ordenar</a:t>
-            </a:r>
-            <a:r>
-              <a:rPr lang="en-US" b="1" u="sng" baseline="0" noProof="0" dirty="0" smtClean="0"/>
-              <a:t> </a:t>
-            </a:r>
-            <a:r>
-              <a:rPr lang="en-US" b="1" u="sng" baseline="0" noProof="0" dirty="0" err="1" smtClean="0"/>
-              <a:t>explicación</a:t>
-            </a:r>
-            <a:r>
-              <a:rPr lang="en-US" b="1" u="sng" baseline="0" noProof="0" dirty="0" smtClean="0"/>
-              <a:t> de </a:t>
-            </a:r>
-            <a:r>
-              <a:rPr lang="en-US" b="1" u="sng" baseline="0" noProof="0" dirty="0" err="1" smtClean="0"/>
-              <a:t>convenciones</a:t>
-            </a:r>
-            <a:endParaRPr lang="es-PE" b="1" u="sng" noProof="0" dirty="0"/>
-          </a:p>
         </p:txBody>
       </p:sp>
       <p:sp>
@@ -1138,12 +1112,6 @@
           <a:p>
             <a:r>
               <a:rPr lang="es-PE" noProof="0" dirty="0" smtClean="0"/>
-              <a:t>Se crea una clase solo para el propósito de las pruebas.</a:t>
-            </a:r>
-          </a:p>
-          <a:p>
-            <a:r>
-              <a:rPr lang="es-PE" noProof="0" dirty="0" smtClean="0"/>
               <a:t>Los</a:t>
             </a:r>
             <a:r>
@@ -6985,31 +6953,7 @@
                 <a:ea typeface="+mn-ea"/>
                 <a:cs typeface="+mn-cs"/>
               </a:rPr>
-              <a:t> Frameworks ya q </a:t>
-            </a:r>
-            <a:r>
-              <a:rPr lang="es-PE" sz="1200" b="0" i="0" kern="1200" baseline="0" noProof="0" dirty="0" smtClean="0">
-                <a:solidFill>
-                  <a:schemeClr val="tx1"/>
-                </a:solidFill>
-                <a:effectLst/>
-                <a:latin typeface="+mn-lt"/>
-                <a:ea typeface="+mn-ea"/>
-                <a:cs typeface="+mn-cs"/>
-              </a:rPr>
-              <a:t>descienden </a:t>
-            </a:r>
-            <a:r>
-              <a:rPr lang="es-PE" sz="1200" b="0" i="0" kern="1200" baseline="0" noProof="0" dirty="0" smtClean="0">
-                <a:solidFill>
-                  <a:schemeClr val="tx1"/>
-                </a:solidFill>
-                <a:effectLst/>
-                <a:latin typeface="+mn-lt"/>
-                <a:ea typeface="+mn-ea"/>
-                <a:cs typeface="+mn-cs"/>
-              </a:rPr>
-              <a:t>o son </a:t>
+              <a:t> Frameworks ya q descienden o son </a:t>
             </a:r>
             <a:r>
               <a:rPr lang="es-PE" sz="1200" b="0" i="0" kern="1200" baseline="0" noProof="0" dirty="0" err="1" smtClean="0">
@@ -7082,19 +7026,7 @@
                 <a:ea typeface="+mn-ea"/>
                 <a:cs typeface="+mn-cs"/>
               </a:rPr>
-              <a:t>Es importante decir, que debido a que estas frameworks nos proveen toda la infraestructura para realizar pruebas, no se utilizan únicamente para realizar pruebas unitarias sino también otros tipos de </a:t>
-            </a:r>
-            <a:r>
-              <a:rPr lang="es-PE" sz="1200" b="0" i="0" kern="1200" baseline="0" noProof="0" dirty="0" smtClean="0">
-                <a:solidFill>
-                  <a:schemeClr val="tx1"/>
-                </a:solidFill>
-                <a:effectLst/>
-                <a:latin typeface="+mn-lt"/>
-                <a:ea typeface="+mn-ea"/>
-                <a:cs typeface="+mn-cs"/>
-              </a:rPr>
-              <a:t>pruebas.</a:t>
+              <a:t>Es importante decir, que debido a que estas frameworks nos proveen toda la infraestructura para realizar pruebas, no se utilizan únicamente para realizar pruebas unitarias sino también otros tipos de pruebas.</a:t>
             </a:r>
           </a:p>
           <a:p>
@@ -7471,7 +7403,7 @@
             <a:fld id="{807CB568-C05F-482F-9F26-AA302B8892DF}" type="datetimeFigureOut">
               <a:rPr lang="es-ES" smtClean="0"/>
               <a:pPr/>
-              <a:t>12/04/2013</a:t>
+              <a:t>17/04/2013</a:t>
             </a:fld>
             <a:endParaRPr lang="es-ES"/>
           </a:p>
@@ -7650,7 +7582,7 @@
             <a:fld id="{807CB568-C05F-482F-9F26-AA302B8892DF}" type="datetimeFigureOut">
               <a:rPr lang="es-ES" smtClean="0"/>
               <a:pPr/>
-              <a:t>12/04/2013</a:t>
+              <a:t>17/04/2013</a:t>
             </a:fld>
             <a:endParaRPr lang="es-ES"/>
           </a:p>
@@ -7839,7 +7771,7 @@
             <a:fld id="{807CB568-C05F-482F-9F26-AA302B8892DF}" type="datetimeFigureOut">
               <a:rPr lang="es-ES" smtClean="0"/>
               <a:pPr/>
-              <a:t>12/04/2013</a:t>
+              <a:t>17/04/2013</a:t>
             </a:fld>
             <a:endParaRPr lang="es-ES"/>
           </a:p>
@@ -8018,7 +7950,7 @@
             <a:fld id="{807CB568-C05F-482F-9F26-AA302B8892DF}" type="datetimeFigureOut">
               <a:rPr lang="es-ES" smtClean="0"/>
               <a:pPr/>
-              <a:t>12/04/2013</a:t>
+              <a:t>17/04/2013</a:t>
             </a:fld>
             <a:endParaRPr lang="es-ES"/>
           </a:p>
@@ -8273,7 +8205,7 @@
             <a:fld id="{807CB568-C05F-482F-9F26-AA302B8892DF}" type="datetimeFigureOut">
               <a:rPr lang="es-ES" smtClean="0"/>
               <a:pPr/>
-              <a:t>12/04/2013</a:t>
+              <a:t>17/04/2013</a:t>
             </a:fld>
             <a:endParaRPr lang="es-ES"/>
           </a:p>
@@ -8570,7 +8502,7 @@
             <a:fld id="{807CB568-C05F-482F-9F26-AA302B8892DF}" type="datetimeFigureOut">
               <a:rPr lang="es-ES" smtClean="0"/>
               <a:pPr/>
-              <a:t>12/04/2013</a:t>
+              <a:t>17/04/2013</a:t>
             </a:fld>
             <a:endParaRPr lang="es-ES"/>
           </a:p>
@@ -9001,7 +8933,7 @@
             <a:fld id="{807CB568-C05F-482F-9F26-AA302B8892DF}" type="datetimeFigureOut">
               <a:rPr lang="es-ES" smtClean="0"/>
               <a:pPr/>
-              <a:t>12/04/2013</a:t>
+              <a:t>17/04/2013</a:t>
             </a:fld>
             <a:endParaRPr lang="es-ES"/>
           </a:p>
@@ -9128,7 +9060,7 @@
             <a:fld id="{807CB568-C05F-482F-9F26-AA302B8892DF}" type="datetimeFigureOut">
               <a:rPr lang="es-ES" smtClean="0"/>
               <a:pPr/>
-              <a:t>12/04/2013</a:t>
+              <a:t>17/04/2013</a:t>
             </a:fld>
             <a:endParaRPr lang="es-ES"/>
           </a:p>
@@ -9232,7 +9164,7 @@
             <a:fld id="{807CB568-C05F-482F-9F26-AA302B8892DF}" type="datetimeFigureOut">
               <a:rPr lang="es-ES" smtClean="0"/>
               <a:pPr/>
-              <a:t>12/04/2013</a:t>
+              <a:t>17/04/2013</a:t>
             </a:fld>
             <a:endParaRPr lang="es-ES"/>
           </a:p>
@@ -9518,7 +9450,7 @@
             <a:fld id="{807CB568-C05F-482F-9F26-AA302B8892DF}" type="datetimeFigureOut">
               <a:rPr lang="es-ES" smtClean="0"/>
               <a:pPr/>
-              <a:t>12/04/2013</a:t>
+              <a:t>17/04/2013</a:t>
             </a:fld>
             <a:endParaRPr lang="es-ES"/>
           </a:p>
@@ -9787,7 +9719,7 @@
             <a:fld id="{807CB568-C05F-482F-9F26-AA302B8892DF}" type="datetimeFigureOut">
               <a:rPr lang="es-ES" smtClean="0"/>
               <a:pPr/>
-              <a:t>12/04/2013</a:t>
+              <a:t>17/04/2013</a:t>
             </a:fld>
             <a:endParaRPr lang="es-ES"/>
           </a:p>
@@ -10038,7 +9970,7 @@
             <a:fld id="{807CB568-C05F-482F-9F26-AA302B8892DF}" type="datetimeFigureOut">
               <a:rPr lang="es-ES" smtClean="0"/>
               <a:pPr/>
-              <a:t>12/04/2013</a:t>
+              <a:t>17/04/2013</a:t>
             </a:fld>
             <a:endParaRPr lang="es-ES"/>
           </a:p>
@@ -13507,7 +13439,6 @@
               <a:rPr lang="es-PE" sz="2400" dirty="0" smtClean="0"/>
               <a:t>Utilitarios que sirven para comprobar que los valores obtenidos al ejecutar la prueba cumplen las condiciones esperadas. </a:t>
             </a:r>
-            <a:endParaRPr lang="es-PE" sz="2400" dirty="0" smtClean="0"/>
           </a:p>
         </p:txBody>
       </p:sp>
@@ -13873,15 +13804,7 @@
           <a:p>
             <a:r>
               <a:rPr lang="es-PE" sz="2400" dirty="0" smtClean="0"/>
-              <a:t>Si </a:t>
-            </a:r>
-            <a:r>
-              <a:rPr lang="es-PE" sz="2400" dirty="0" smtClean="0"/>
-              <a:t>la condición no se cumple, se lanza una excepción y nos </a:t>
-            </a:r>
-            <a:r>
-              <a:rPr lang="es-PE" sz="2400" dirty="0" smtClean="0"/>
-              <a:t>devuelven un mensaje con información precisa para poder solucionar el problema.</a:t>
+              <a:t>Si la condición no se cumple, se lanza una excepción y nos devuelven un mensaje con información precisa para poder solucionar el problema.</a:t>
             </a:r>
             <a:endParaRPr lang="es-PE" sz="2400" dirty="0" smtClean="0">
               <a:solidFill>
@@ -14741,7 +14664,7 @@
                   <a:srgbClr val="00823B"/>
                 </a:solidFill>
               </a:rPr>
-              <a:t>Estructura de una prueba</a:t>
+              <a:t>Estructura Universal de una Prueba</a:t>
             </a:r>
             <a:endParaRPr lang="es-PE" dirty="0">
               <a:solidFill>
@@ -19328,9 +19251,282 @@
           </a:p>
         </p:txBody>
       </p:sp>
+      <p:sp>
+        <p:nvSpPr>
+          <p:cNvPr id="7" name="2 Título"/>
+          <p:cNvSpPr txBox="1">
+            <a:spLocks/>
+          </p:cNvSpPr>
+          <p:nvPr/>
+        </p:nvSpPr>
+        <p:spPr bwMode="auto">
+          <a:xfrm>
+            <a:off x="0" y="379020"/>
+            <a:ext cx="9135414" cy="1012974"/>
+          </a:xfrm>
+          <a:prstGeom prst="rect">
+            <a:avLst/>
+          </a:prstGeom>
+          <a:noFill/>
+          <a:ln w="9525">
+            <a:noFill/>
+            <a:miter lim="800000"/>
+            <a:headEnd/>
+            <a:tailEnd/>
+          </a:ln>
+        </p:spPr>
+        <p:txBody>
+          <a:bodyPr vert="horz" wrap="square" lIns="91440" tIns="45720" rIns="91440" bIns="45720" numCol="1" anchor="ctr" anchorCtr="0" compatLnSpc="1">
+            <a:prstTxWarp prst="textNoShape">
+              <a:avLst/>
+            </a:prstTxWarp>
+          </a:bodyPr>
+          <a:lstStyle>
+            <a:lvl1pPr algn="ctr" rtl="0" eaLnBrk="1" fontAlgn="base" hangingPunct="1">
+              <a:spcBef>
+                <a:spcPct val="0"/>
+              </a:spcBef>
+              <a:spcAft>
+                <a:spcPct val="0"/>
+              </a:spcAft>
+              <a:defRPr sz="4400" kern="1200">
+                <a:solidFill>
+                  <a:schemeClr val="tx1"/>
+                </a:solidFill>
+                <a:latin typeface="+mj-lt"/>
+                <a:ea typeface="+mj-ea"/>
+                <a:cs typeface="+mj-cs"/>
+              </a:defRPr>
+            </a:lvl1pPr>
+            <a:lvl2pPr algn="ctr" rtl="0" eaLnBrk="1" fontAlgn="base" hangingPunct="1">
+              <a:spcBef>
+                <a:spcPct val="0"/>
+              </a:spcBef>
+              <a:spcAft>
+                <a:spcPct val="0"/>
+              </a:spcAft>
+              <a:defRPr sz="4400">
+                <a:solidFill>
+                  <a:schemeClr val="tx1"/>
+                </a:solidFill>
+                <a:latin typeface="Calibri" pitchFamily="34" charset="0"/>
+              </a:defRPr>
+            </a:lvl2pPr>
+            <a:lvl3pPr algn="ctr" rtl="0" eaLnBrk="1" fontAlgn="base" hangingPunct="1">
+              <a:spcBef>
+                <a:spcPct val="0"/>
+              </a:spcBef>
+              <a:spcAft>
+                <a:spcPct val="0"/>
+              </a:spcAft>
+              <a:defRPr sz="4400">
+                <a:solidFill>
+                  <a:schemeClr val="tx1"/>
+                </a:solidFill>
+                <a:latin typeface="Calibri" pitchFamily="34" charset="0"/>
+              </a:defRPr>
+            </a:lvl3pPr>
+            <a:lvl4pPr algn="ctr" rtl="0" eaLnBrk="1" fontAlgn="base" hangingPunct="1">
+              <a:spcBef>
+                <a:spcPct val="0"/>
+              </a:spcBef>
+              <a:spcAft>
+                <a:spcPct val="0"/>
+              </a:spcAft>
+              <a:defRPr sz="4400">
+                <a:solidFill>
+                  <a:schemeClr val="tx1"/>
+                </a:solidFill>
+                <a:latin typeface="Calibri" pitchFamily="34" charset="0"/>
+              </a:defRPr>
+            </a:lvl4pPr>
+            <a:lvl5pPr algn="ctr" rtl="0" eaLnBrk="1" fontAlgn="base" hangingPunct="1">
+              <a:spcBef>
+                <a:spcPct val="0"/>
+              </a:spcBef>
+              <a:spcAft>
+                <a:spcPct val="0"/>
+              </a:spcAft>
+              <a:defRPr sz="4400">
+                <a:solidFill>
+                  <a:schemeClr val="tx1"/>
+                </a:solidFill>
+                <a:latin typeface="Calibri" pitchFamily="34" charset="0"/>
+              </a:defRPr>
+            </a:lvl5pPr>
+            <a:lvl6pPr marL="457200" algn="ctr" rtl="0" eaLnBrk="1" fontAlgn="base" hangingPunct="1">
+              <a:spcBef>
+                <a:spcPct val="0"/>
+              </a:spcBef>
+              <a:spcAft>
+                <a:spcPct val="0"/>
+              </a:spcAft>
+              <a:defRPr sz="4400">
+                <a:solidFill>
+                  <a:schemeClr val="tx1"/>
+                </a:solidFill>
+                <a:latin typeface="Calibri" pitchFamily="34" charset="0"/>
+              </a:defRPr>
+            </a:lvl6pPr>
+            <a:lvl7pPr marL="914400" algn="ctr" rtl="0" eaLnBrk="1" fontAlgn="base" hangingPunct="1">
+              <a:spcBef>
+                <a:spcPct val="0"/>
+              </a:spcBef>
+              <a:spcAft>
+                <a:spcPct val="0"/>
+              </a:spcAft>
+              <a:defRPr sz="4400">
+                <a:solidFill>
+                  <a:schemeClr val="tx1"/>
+                </a:solidFill>
+                <a:latin typeface="Calibri" pitchFamily="34" charset="0"/>
+              </a:defRPr>
+            </a:lvl7pPr>
+            <a:lvl8pPr marL="1371600" algn="ctr" rtl="0" eaLnBrk="1" fontAlgn="base" hangingPunct="1">
+              <a:spcBef>
+                <a:spcPct val="0"/>
+              </a:spcBef>
+              <a:spcAft>
+                <a:spcPct val="0"/>
+              </a:spcAft>
+              <a:defRPr sz="4400">
+                <a:solidFill>
+                  <a:schemeClr val="tx1"/>
+                </a:solidFill>
+                <a:latin typeface="Calibri" pitchFamily="34" charset="0"/>
+              </a:defRPr>
+            </a:lvl8pPr>
+            <a:lvl9pPr marL="1828800" algn="ctr" rtl="0" eaLnBrk="1" fontAlgn="base" hangingPunct="1">
+              <a:spcBef>
+                <a:spcPct val="0"/>
+              </a:spcBef>
+              <a:spcAft>
+                <a:spcPct val="0"/>
+              </a:spcAft>
+              <a:defRPr sz="4400">
+                <a:solidFill>
+                  <a:schemeClr val="tx1"/>
+                </a:solidFill>
+                <a:latin typeface="Calibri" pitchFamily="34" charset="0"/>
+              </a:defRPr>
+            </a:lvl9pPr>
+          </a:lstStyle>
+          <a:p>
+            <a:r>
+              <a:rPr lang="es-PE" dirty="0" smtClean="0">
+                <a:solidFill>
+                  <a:srgbClr val="00823B"/>
+                </a:solidFill>
+              </a:rPr>
+              <a:t>¿</a:t>
+            </a:r>
+            <a:r>
+              <a:rPr lang="en-US" dirty="0" err="1" smtClean="0">
+                <a:solidFill>
+                  <a:srgbClr val="00823B"/>
+                </a:solidFill>
+              </a:rPr>
+              <a:t>Por</a:t>
+            </a:r>
+            <a:r>
+              <a:rPr lang="en-US" dirty="0" smtClean="0">
+                <a:solidFill>
+                  <a:srgbClr val="00823B"/>
+                </a:solidFill>
+              </a:rPr>
+              <a:t> </a:t>
+            </a:r>
+            <a:r>
+              <a:rPr lang="en-US" dirty="0" err="1" smtClean="0">
+                <a:solidFill>
+                  <a:srgbClr val="00823B"/>
+                </a:solidFill>
+              </a:rPr>
+              <a:t>qué</a:t>
+            </a:r>
+            <a:r>
+              <a:rPr lang="en-US" dirty="0" smtClean="0">
+                <a:solidFill>
+                  <a:srgbClr val="00823B"/>
+                </a:solidFill>
+              </a:rPr>
+              <a:t> no </a:t>
+            </a:r>
+            <a:r>
+              <a:rPr lang="en-US" dirty="0" err="1" smtClean="0">
+                <a:solidFill>
+                  <a:srgbClr val="00823B"/>
+                </a:solidFill>
+              </a:rPr>
+              <a:t>escribir</a:t>
+            </a:r>
+            <a:r>
+              <a:rPr lang="en-US" dirty="0" smtClean="0">
+                <a:solidFill>
+                  <a:srgbClr val="00823B"/>
+                </a:solidFill>
+              </a:rPr>
+              <a:t> </a:t>
+            </a:r>
+            <a:r>
+              <a:rPr lang="en-US" dirty="0" err="1" smtClean="0">
+                <a:solidFill>
+                  <a:srgbClr val="00823B"/>
+                </a:solidFill>
+              </a:rPr>
+              <a:t>pruebas</a:t>
+            </a:r>
+            <a:r>
+              <a:rPr lang="en-US" dirty="0" smtClean="0">
+                <a:solidFill>
+                  <a:srgbClr val="00823B"/>
+                </a:solidFill>
+              </a:rPr>
+              <a:t> </a:t>
+            </a:r>
+            <a:r>
+              <a:rPr lang="en-US" dirty="0" err="1" smtClean="0">
+                <a:solidFill>
+                  <a:srgbClr val="00823B"/>
+                </a:solidFill>
+              </a:rPr>
+              <a:t>más</a:t>
+            </a:r>
+            <a:r>
+              <a:rPr lang="en-US" dirty="0" smtClean="0">
+                <a:solidFill>
+                  <a:srgbClr val="00823B"/>
+                </a:solidFill>
+              </a:rPr>
+              <a:t> </a:t>
+            </a:r>
+            <a:r>
+              <a:rPr lang="en-US" dirty="0" err="1" smtClean="0">
+                <a:solidFill>
+                  <a:srgbClr val="00823B"/>
+                </a:solidFill>
+              </a:rPr>
+              <a:t>grandes</a:t>
+            </a:r>
+            <a:r>
+              <a:rPr lang="en-US" dirty="0" smtClean="0">
+                <a:solidFill>
+                  <a:srgbClr val="00823B"/>
+                </a:solidFill>
+              </a:rPr>
+              <a:t>?</a:t>
+            </a:r>
+            <a:endParaRPr lang="es-PE" dirty="0">
+              <a:solidFill>
+                <a:srgbClr val="00823B"/>
+              </a:solidFill>
+            </a:endParaRPr>
+          </a:p>
+        </p:txBody>
+      </p:sp>
       <p:pic>
         <p:nvPicPr>
-          <p:cNvPr id="2050" name="Picture 2"/>
+          <p:cNvPr id="6" name="Picture 2"/>
           <p:cNvPicPr>
             <a:picLocks noChangeAspect="1" noChangeArrowheads="1"/>
           </p:cNvPicPr>
@@ -19392,279 +19588,6 @@
           </a:extLst>
         </p:spPr>
       </p:pic>
-      <p:sp>
-        <p:nvSpPr>
-          <p:cNvPr id="7" name="2 Título"/>
-          <p:cNvSpPr txBox="1">
-            <a:spLocks/>
-          </p:cNvSpPr>
-          <p:nvPr/>
-        </p:nvSpPr>
-        <p:spPr bwMode="auto">
-          <a:xfrm>
-            <a:off x="0" y="379020"/>
-            <a:ext cx="9135414" cy="1012974"/>
-          </a:xfrm>
-          <a:prstGeom prst="rect">
-            <a:avLst/>
-          </a:prstGeom>
-          <a:noFill/>
-          <a:ln w="9525">
-            <a:noFill/>
-            <a:miter lim="800000"/>
-            <a:headEnd/>
-            <a:tailEnd/>
-          </a:ln>
-        </p:spPr>
-        <p:txBody>
-          <a:bodyPr vert="horz" wrap="square" lIns="91440" tIns="45720" rIns="91440" bIns="45720" numCol="1" anchor="ctr" anchorCtr="0" compatLnSpc="1">
-            <a:prstTxWarp prst="textNoShape">
-              <a:avLst/>
-            </a:prstTxWarp>
-          </a:bodyPr>
-          <a:lstStyle>
-            <a:lvl1pPr algn="ctr" rtl="0" eaLnBrk="1" fontAlgn="base" hangingPunct="1">
-              <a:spcBef>
-                <a:spcPct val="0"/>
-              </a:spcBef>
-              <a:spcAft>
-                <a:spcPct val="0"/>
-              </a:spcAft>
-              <a:defRPr sz="4400" kern="1200">
-                <a:solidFill>
-                  <a:schemeClr val="tx1"/>
-                </a:solidFill>
-                <a:latin typeface="+mj-lt"/>
-                <a:ea typeface="+mj-ea"/>
-                <a:cs typeface="+mj-cs"/>
-              </a:defRPr>
-            </a:lvl1pPr>
-            <a:lvl2pPr algn="ctr" rtl="0" eaLnBrk="1" fontAlgn="base" hangingPunct="1">
-              <a:spcBef>
-                <a:spcPct val="0"/>
-              </a:spcBef>
-              <a:spcAft>
-                <a:spcPct val="0"/>
-              </a:spcAft>
-              <a:defRPr sz="4400">
-                <a:solidFill>
-                  <a:schemeClr val="tx1"/>
-                </a:solidFill>
-                <a:latin typeface="Calibri" pitchFamily="34" charset="0"/>
-              </a:defRPr>
-            </a:lvl2pPr>
-            <a:lvl3pPr algn="ctr" rtl="0" eaLnBrk="1" fontAlgn="base" hangingPunct="1">
-              <a:spcBef>
-                <a:spcPct val="0"/>
-              </a:spcBef>
-              <a:spcAft>
-                <a:spcPct val="0"/>
-              </a:spcAft>
-              <a:defRPr sz="4400">
-                <a:solidFill>
-                  <a:schemeClr val="tx1"/>
-                </a:solidFill>
-                <a:latin typeface="Calibri" pitchFamily="34" charset="0"/>
-              </a:defRPr>
-            </a:lvl3pPr>
-            <a:lvl4pPr algn="ctr" rtl="0" eaLnBrk="1" fontAlgn="base" hangingPunct="1">
-              <a:spcBef>
-                <a:spcPct val="0"/>
-              </a:spcBef>
-              <a:spcAft>
-                <a:spcPct val="0"/>
-              </a:spcAft>
-              <a:defRPr sz="4400">
-                <a:solidFill>
-                  <a:schemeClr val="tx1"/>
-                </a:solidFill>
-                <a:latin typeface="Calibri" pitchFamily="34" charset="0"/>
-              </a:defRPr>
-            </a:lvl4pPr>
-            <a:lvl5pPr algn="ctr" rtl="0" eaLnBrk="1" fontAlgn="base" hangingPunct="1">
-              <a:spcBef>
-                <a:spcPct val="0"/>
-              </a:spcBef>
-              <a:spcAft>
-                <a:spcPct val="0"/>
-              </a:spcAft>
-              <a:defRPr sz="4400">
-                <a:solidFill>
-                  <a:schemeClr val="tx1"/>
-                </a:solidFill>
-                <a:latin typeface="Calibri" pitchFamily="34" charset="0"/>
-              </a:defRPr>
-            </a:lvl5pPr>
-            <a:lvl6pPr marL="457200" algn="ctr" rtl="0" eaLnBrk="1" fontAlgn="base" hangingPunct="1">
-              <a:spcBef>
-                <a:spcPct val="0"/>
-              </a:spcBef>
-              <a:spcAft>
-                <a:spcPct val="0"/>
-              </a:spcAft>
-              <a:defRPr sz="4400">
-                <a:solidFill>
-                  <a:schemeClr val="tx1"/>
-                </a:solidFill>
-                <a:latin typeface="Calibri" pitchFamily="34" charset="0"/>
-              </a:defRPr>
-            </a:lvl6pPr>
-            <a:lvl7pPr marL="914400" algn="ctr" rtl="0" eaLnBrk="1" fontAlgn="base" hangingPunct="1">
-              <a:spcBef>
-                <a:spcPct val="0"/>
-              </a:spcBef>
-              <a:spcAft>
-                <a:spcPct val="0"/>
-              </a:spcAft>
-              <a:defRPr sz="4400">
-                <a:solidFill>
-                  <a:schemeClr val="tx1"/>
-                </a:solidFill>
-                <a:latin typeface="Calibri" pitchFamily="34" charset="0"/>
-              </a:defRPr>
-            </a:lvl7pPr>
-            <a:lvl8pPr marL="1371600" algn="ctr" rtl="0" eaLnBrk="1" fontAlgn="base" hangingPunct="1">
-              <a:spcBef>
-                <a:spcPct val="0"/>
-              </a:spcBef>
-              <a:spcAft>
-                <a:spcPct val="0"/>
-              </a:spcAft>
-              <a:defRPr sz="4400">
-                <a:solidFill>
-                  <a:schemeClr val="tx1"/>
-                </a:solidFill>
-                <a:latin typeface="Calibri" pitchFamily="34" charset="0"/>
-              </a:defRPr>
-            </a:lvl8pPr>
-            <a:lvl9pPr marL="1828800" algn="ctr" rtl="0" eaLnBrk="1" fontAlgn="base" hangingPunct="1">
-              <a:spcBef>
-                <a:spcPct val="0"/>
-              </a:spcBef>
-              <a:spcAft>
-                <a:spcPct val="0"/>
-              </a:spcAft>
-              <a:defRPr sz="4400">
-                <a:solidFill>
-                  <a:schemeClr val="tx1"/>
-                </a:solidFill>
-                <a:latin typeface="Calibri" pitchFamily="34" charset="0"/>
-              </a:defRPr>
-            </a:lvl9pPr>
-          </a:lstStyle>
-          <a:p>
-            <a:r>
-              <a:rPr lang="es-PE" dirty="0" smtClean="0">
-                <a:solidFill>
-                  <a:srgbClr val="00823B"/>
-                </a:solidFill>
-              </a:rPr>
-              <a:t>¿</a:t>
-            </a:r>
-            <a:r>
-              <a:rPr lang="en-US" dirty="0" err="1" smtClean="0">
-                <a:solidFill>
-                  <a:srgbClr val="00823B"/>
-                </a:solidFill>
-              </a:rPr>
-              <a:t>Por</a:t>
-            </a:r>
-            <a:r>
-              <a:rPr lang="en-US" dirty="0" smtClean="0">
-                <a:solidFill>
-                  <a:srgbClr val="00823B"/>
-                </a:solidFill>
-              </a:rPr>
-              <a:t> </a:t>
-            </a:r>
-            <a:r>
-              <a:rPr lang="en-US" dirty="0" err="1" smtClean="0">
-                <a:solidFill>
-                  <a:srgbClr val="00823B"/>
-                </a:solidFill>
-              </a:rPr>
-              <a:t>qué</a:t>
-            </a:r>
-            <a:r>
-              <a:rPr lang="en-US" dirty="0" smtClean="0">
-                <a:solidFill>
-                  <a:srgbClr val="00823B"/>
-                </a:solidFill>
-              </a:rPr>
-              <a:t> no </a:t>
-            </a:r>
-            <a:r>
-              <a:rPr lang="en-US" dirty="0" err="1" smtClean="0">
-                <a:solidFill>
-                  <a:srgbClr val="00823B"/>
-                </a:solidFill>
-              </a:rPr>
-              <a:t>escribir</a:t>
-            </a:r>
-            <a:r>
-              <a:rPr lang="en-US" dirty="0" smtClean="0">
-                <a:solidFill>
-                  <a:srgbClr val="00823B"/>
-                </a:solidFill>
-              </a:rPr>
-              <a:t> </a:t>
-            </a:r>
-            <a:r>
-              <a:rPr lang="en-US" dirty="0" err="1" smtClean="0">
-                <a:solidFill>
-                  <a:srgbClr val="00823B"/>
-                </a:solidFill>
-              </a:rPr>
-              <a:t>pruebas</a:t>
-            </a:r>
-            <a:r>
-              <a:rPr lang="en-US" dirty="0" smtClean="0">
-                <a:solidFill>
-                  <a:srgbClr val="00823B"/>
-                </a:solidFill>
-              </a:rPr>
-              <a:t> </a:t>
-            </a:r>
-            <a:r>
-              <a:rPr lang="en-US" dirty="0" err="1" smtClean="0">
-                <a:solidFill>
-                  <a:srgbClr val="00823B"/>
-                </a:solidFill>
-              </a:rPr>
-              <a:t>más</a:t>
-            </a:r>
-            <a:r>
-              <a:rPr lang="en-US" dirty="0" smtClean="0">
-                <a:solidFill>
-                  <a:srgbClr val="00823B"/>
-                </a:solidFill>
-              </a:rPr>
-              <a:t> </a:t>
-            </a:r>
-            <a:r>
-              <a:rPr lang="en-US" dirty="0" err="1" smtClean="0">
-                <a:solidFill>
-                  <a:srgbClr val="00823B"/>
-                </a:solidFill>
-              </a:rPr>
-              <a:t>grandes</a:t>
-            </a:r>
-            <a:r>
-              <a:rPr lang="en-US" dirty="0" smtClean="0">
-                <a:solidFill>
-                  <a:srgbClr val="00823B"/>
-                </a:solidFill>
-              </a:rPr>
-              <a:t>?</a:t>
-            </a:r>
-            <a:endParaRPr lang="es-PE" dirty="0">
-              <a:solidFill>
-                <a:srgbClr val="00823B"/>
-              </a:solidFill>
-            </a:endParaRPr>
-          </a:p>
-        </p:txBody>
-      </p:sp>
     </p:spTree>
     <p:extLst>
       <p:ext uri="{BB962C8B-B14F-4D97-AF65-F5344CB8AC3E}">
@@ -27111,23 +27034,7 @@
             </a:pPr>
             <a:r>
               <a:rPr lang="es-PE" sz="2800" dirty="0" smtClean="0"/>
-              <a:t>Permiten ejecutar lógica </a:t>
-            </a:r>
-            <a:r>
-              <a:rPr lang="es-PE" sz="2800" dirty="0" smtClean="0"/>
-              <a:t>específica a </a:t>
-            </a:r>
-            <a:r>
-              <a:rPr lang="es-PE" sz="2800" dirty="0" smtClean="0"/>
-              <a:t>nuestras pruebas </a:t>
-            </a:r>
-            <a:r>
-              <a:rPr lang="es-PE" sz="2800" dirty="0" smtClean="0"/>
-              <a:t>sin preocuparnos por la infraestructura </a:t>
-            </a:r>
-            <a:r>
-              <a:rPr lang="es-PE" sz="2800" dirty="0" smtClean="0"/>
-              <a:t>necesaria.</a:t>
+              <a:t>Permiten ejecutar lógica específica a nuestras pruebas sin preocuparnos por la infraestructura necesaria.</a:t>
             </a:r>
           </a:p>
           <a:p>
@@ -27263,7 +27170,6 @@
               <a:rPr lang="es-PE" sz="2400" dirty="0" smtClean="0"/>
               <a:t>, ….. </a:t>
             </a:r>
-            <a:endParaRPr lang="es-PE" sz="2400" dirty="0" smtClean="0"/>
           </a:p>
           <a:p>
             <a:pPr lvl="1" indent="-342900">

</xml_diff>